<commit_message>
Updated pptx to include github link
</commit_message>
<xml_diff>
--- a/Steam Games DB.pptx
+++ b/Steam Games DB.pptx
@@ -9674,8 +9674,7 @@
               <a:buNone/>
             </a:pPr>
             <a:r>
-              <a:rPr lang="en"/>
-              <a:t>By Richard Edwards and Nevin Jom</a:t>
+              <a:t/>
             </a:r>
             <a:endParaRPr/>
           </a:p>
@@ -9845,6 +9844,26 @@
             <a:r>
               <a:rPr lang="en"/>
               <a:t>Users can also check what games are currently on sale.</a:t>
+            </a:r>
+            <a:endParaRPr/>
+          </a:p>
+          <a:p>
+            <a:pPr indent="-311150" lvl="0" marL="457200" rtl="0" algn="l">
+              <a:lnSpc>
+                <a:spcPct val="150000"/>
+              </a:lnSpc>
+              <a:spcBef>
+                <a:spcPts val="0"/>
+              </a:spcBef>
+              <a:spcAft>
+                <a:spcPts val="0"/>
+              </a:spcAft>
+              <a:buSzPts val="1300"/>
+              <a:buChar char="●"/>
+            </a:pPr>
+            <a:r>
+              <a:rPr lang="en"/>
+              <a:t>Github link: https://github.com/BreadsRL/SteamDB</a:t>
             </a:r>
             <a:endParaRPr/>
           </a:p>

</xml_diff>